<commit_message>
WebMedia - inclusão de agradecimentos
</commit_message>
<xml_diff>
--- a/1-Meus-Artigos/WebMedia11/apresentaçãoBR.pptx
+++ b/1-Meus-Artigos/WebMedia11/apresentaçãoBR.pptx
@@ -6307,18 +6307,18 @@
     </dgm:pt>
   </dgm:ptLst>
   <dgm:cxnLst>
-    <dgm:cxn modelId="{474BD284-DDA0-40B7-BE67-E680100C0BA6}" type="presOf" srcId="{AFD31390-6AC1-4FA3-BAED-940C68F6DC88}" destId="{DE5A9EAF-482B-4BF2-AF77-13EAE24C70B0}" srcOrd="0" destOrd="0" presId="urn:microsoft.com/office/officeart/2005/8/layout/hierarchy6"/>
-    <dgm:cxn modelId="{2C35BF0B-E778-455F-8EA9-1CC3576F2CC5}" type="presOf" srcId="{F9BF59C0-DF44-4744-B321-308C735D2948}" destId="{8282B123-79D2-4E0A-BF9E-E258F9155E15}" srcOrd="0" destOrd="0" presId="urn:microsoft.com/office/officeart/2005/8/layout/hierarchy6"/>
-    <dgm:cxn modelId="{2B85FEF0-B847-4A8A-87B4-9BDE9F895280}" type="presOf" srcId="{8D5FDD50-92B6-484D-9F33-ECBEC3DBA967}" destId="{28B760FA-B381-41EC-8B4D-492CAB381BC4}" srcOrd="0" destOrd="0" presId="urn:microsoft.com/office/officeart/2005/8/layout/hierarchy6"/>
-    <dgm:cxn modelId="{763D6D6D-5218-434B-BE87-69F30F18F90C}" type="presOf" srcId="{27D2D03C-6B7C-48CB-A639-65E257CC0E96}" destId="{F1E4FA91-E817-4642-B67C-69461E749193}" srcOrd="0" destOrd="0" presId="urn:microsoft.com/office/officeart/2005/8/layout/hierarchy6"/>
-    <dgm:cxn modelId="{D8D2EFDF-E195-456E-A510-3C60889FEAB4}" type="presOf" srcId="{CB4D62B7-20A0-42CA-B7A0-532513CCE3B9}" destId="{6B9BE3B4-6371-45FE-A71C-6E55CC800E74}" srcOrd="0" destOrd="0" presId="urn:microsoft.com/office/officeart/2005/8/layout/hierarchy6"/>
+    <dgm:cxn modelId="{4DB2AC0F-39E4-401D-8E5C-59CAB2B05FD6}" srcId="{32F57AC1-33E6-4385-87AA-54CA417DA641}" destId="{AFD31390-6AC1-4FA3-BAED-940C68F6DC88}" srcOrd="0" destOrd="0" parTransId="{5FF24799-9D94-4C82-BD4D-140D4015CB2B}" sibTransId="{419E9FC1-BC4A-4460-8112-FCFA3CD98EFD}"/>
     <dgm:cxn modelId="{5759436E-0925-4D61-A8DD-C88825E506BA}" srcId="{8D5FDD50-92B6-484D-9F33-ECBEC3DBA967}" destId="{32F57AC1-33E6-4385-87AA-54CA417DA641}" srcOrd="0" destOrd="0" parTransId="{4CF32539-B159-4D5B-8813-0F2517A92619}" sibTransId="{1D3139AF-ED12-4B35-986A-3B8D78646C94}"/>
     <dgm:cxn modelId="{B001E01C-AF69-4B79-A4F1-94C26395D088}" srcId="{AFD31390-6AC1-4FA3-BAED-940C68F6DC88}" destId="{ED7F2F8B-596F-4ACC-88C7-425BD0C69125}" srcOrd="0" destOrd="0" parTransId="{CB4D62B7-20A0-42CA-B7A0-532513CCE3B9}" sibTransId="{57829ED3-75E3-4323-A3BE-308A2C52FF80}"/>
-    <dgm:cxn modelId="{4DB2AC0F-39E4-401D-8E5C-59CAB2B05FD6}" srcId="{32F57AC1-33E6-4385-87AA-54CA417DA641}" destId="{AFD31390-6AC1-4FA3-BAED-940C68F6DC88}" srcOrd="0" destOrd="0" parTransId="{5FF24799-9D94-4C82-BD4D-140D4015CB2B}" sibTransId="{419E9FC1-BC4A-4460-8112-FCFA3CD98EFD}"/>
+    <dgm:cxn modelId="{2B85FEF0-B847-4A8A-87B4-9BDE9F895280}" type="presOf" srcId="{8D5FDD50-92B6-484D-9F33-ECBEC3DBA967}" destId="{28B760FA-B381-41EC-8B4D-492CAB381BC4}" srcOrd="0" destOrd="0" presId="urn:microsoft.com/office/officeart/2005/8/layout/hierarchy6"/>
+    <dgm:cxn modelId="{52C786D5-BD91-45F1-8D9C-BFC093425D52}" type="presOf" srcId="{ED7F2F8B-596F-4ACC-88C7-425BD0C69125}" destId="{382C07DB-DF31-4C35-A8A6-001339A6AF65}" srcOrd="0" destOrd="0" presId="urn:microsoft.com/office/officeart/2005/8/layout/hierarchy6"/>
+    <dgm:cxn modelId="{2C2A58B9-C1C1-4E99-8F9F-57F5352C17B3}" srcId="{32F57AC1-33E6-4385-87AA-54CA417DA641}" destId="{F9BF59C0-DF44-4744-B321-308C735D2948}" srcOrd="1" destOrd="0" parTransId="{27D2D03C-6B7C-48CB-A639-65E257CC0E96}" sibTransId="{621FCEB5-3DC7-49FE-9793-8D4BC0648D86}"/>
+    <dgm:cxn modelId="{D8D2EFDF-E195-456E-A510-3C60889FEAB4}" type="presOf" srcId="{CB4D62B7-20A0-42CA-B7A0-532513CCE3B9}" destId="{6B9BE3B4-6371-45FE-A71C-6E55CC800E74}" srcOrd="0" destOrd="0" presId="urn:microsoft.com/office/officeart/2005/8/layout/hierarchy6"/>
+    <dgm:cxn modelId="{2C35BF0B-E778-455F-8EA9-1CC3576F2CC5}" type="presOf" srcId="{F9BF59C0-DF44-4744-B321-308C735D2948}" destId="{8282B123-79D2-4E0A-BF9E-E258F9155E15}" srcOrd="0" destOrd="0" presId="urn:microsoft.com/office/officeart/2005/8/layout/hierarchy6"/>
     <dgm:cxn modelId="{55BF83A4-F04F-4C82-80E8-B3446C1204F8}" type="presOf" srcId="{32F57AC1-33E6-4385-87AA-54CA417DA641}" destId="{6C530A79-90C4-49C8-A5F2-23392F853946}" srcOrd="0" destOrd="0" presId="urn:microsoft.com/office/officeart/2005/8/layout/hierarchy6"/>
+    <dgm:cxn modelId="{763D6D6D-5218-434B-BE87-69F30F18F90C}" type="presOf" srcId="{27D2D03C-6B7C-48CB-A639-65E257CC0E96}" destId="{F1E4FA91-E817-4642-B67C-69461E749193}" srcOrd="0" destOrd="0" presId="urn:microsoft.com/office/officeart/2005/8/layout/hierarchy6"/>
     <dgm:cxn modelId="{85976767-C394-4071-9C1F-15047D94CC7E}" type="presOf" srcId="{5FF24799-9D94-4C82-BD4D-140D4015CB2B}" destId="{ED59F7BD-492C-44FF-BA19-C9825A4FB025}" srcOrd="0" destOrd="0" presId="urn:microsoft.com/office/officeart/2005/8/layout/hierarchy6"/>
-    <dgm:cxn modelId="{2C2A58B9-C1C1-4E99-8F9F-57F5352C17B3}" srcId="{32F57AC1-33E6-4385-87AA-54CA417DA641}" destId="{F9BF59C0-DF44-4744-B321-308C735D2948}" srcOrd="1" destOrd="0" parTransId="{27D2D03C-6B7C-48CB-A639-65E257CC0E96}" sibTransId="{621FCEB5-3DC7-49FE-9793-8D4BC0648D86}"/>
-    <dgm:cxn modelId="{52C786D5-BD91-45F1-8D9C-BFC093425D52}" type="presOf" srcId="{ED7F2F8B-596F-4ACC-88C7-425BD0C69125}" destId="{382C07DB-DF31-4C35-A8A6-001339A6AF65}" srcOrd="0" destOrd="0" presId="urn:microsoft.com/office/officeart/2005/8/layout/hierarchy6"/>
+    <dgm:cxn modelId="{474BD284-DDA0-40B7-BE67-E680100C0BA6}" type="presOf" srcId="{AFD31390-6AC1-4FA3-BAED-940C68F6DC88}" destId="{DE5A9EAF-482B-4BF2-AF77-13EAE24C70B0}" srcOrd="0" destOrd="0" presId="urn:microsoft.com/office/officeart/2005/8/layout/hierarchy6"/>
     <dgm:cxn modelId="{0D574B9A-3F1D-41FC-934F-4522C421C762}" type="presParOf" srcId="{28B760FA-B381-41EC-8B4D-492CAB381BC4}" destId="{3B16B6A1-0DAE-46FF-8BBD-EDBC7A332D6C}" srcOrd="0" destOrd="0" presId="urn:microsoft.com/office/officeart/2005/8/layout/hierarchy6"/>
     <dgm:cxn modelId="{4AC8794D-068A-4D82-A274-4C581D70FF2E}" type="presParOf" srcId="{3B16B6A1-0DAE-46FF-8BBD-EDBC7A332D6C}" destId="{010D124E-7220-40C4-B1FE-D515AE2A5227}" srcOrd="0" destOrd="0" presId="urn:microsoft.com/office/officeart/2005/8/layout/hierarchy6"/>
     <dgm:cxn modelId="{7DAECEBF-50B9-45FA-8316-E8144AA40621}" type="presParOf" srcId="{010D124E-7220-40C4-B1FE-D515AE2A5227}" destId="{D546113F-0EE7-47CB-AF4A-7B882A2C2C6B}" srcOrd="0" destOrd="0" presId="urn:microsoft.com/office/officeart/2005/8/layout/hierarchy6"/>
@@ -7499,7 +7499,6 @@
             <a:rPr lang="pt-BR" noProof="0" dirty="0" smtClean="0"/>
             <a:t>Reversão Anaglífica</a:t>
           </a:r>
-          <a:endParaRPr lang="pt-BR" noProof="0" dirty="0" smtClean="0"/>
         </a:p>
       </dgm:t>
     </dgm:pt>
@@ -11062,7 +11061,6 @@
             <a:rPr lang="pt-BR" sz="1800" kern="1200" noProof="0" dirty="0" smtClean="0"/>
             <a:t>Reversão Anaglífica</a:t>
           </a:r>
-          <a:endParaRPr lang="pt-BR" sz="1800" kern="1200" noProof="0" dirty="0" smtClean="0"/>
         </a:p>
       </dsp:txBody>
       <dsp:txXfrm>
@@ -27767,7 +27765,6 @@
               <a:rPr lang="pt-BR" dirty="0" smtClean="0"/>
               <a:t>Tabela de Índice de Cores</a:t>
             </a:r>
-            <a:endParaRPr lang="pt-BR" dirty="0" smtClean="0"/>
           </a:p>
         </p:txBody>
       </p:sp>
@@ -28135,7 +28132,6 @@
               <a:rPr lang="pt-BR" dirty="0"/>
               <a:t>Conversão e Reversão Anaglífica</a:t>
             </a:r>
-            <a:endParaRPr lang="pt-BR" dirty="0"/>
           </a:p>
         </p:txBody>
       </p:sp>
@@ -28196,13 +28192,8 @@
           <a:p>
             <a:r>
               <a:rPr lang="pt-BR" sz="2200" dirty="0" smtClean="0"/>
-              <a:t>Com base nos resultados de </a:t>
+              <a:t>Com base nos resultados de [2] e [3]</a:t>
             </a:r>
-            <a:r>
-              <a:rPr lang="pt-BR" sz="2200" dirty="0" smtClean="0"/>
-              <a:t>[2] e [3]</a:t>
-            </a:r>
-            <a:endParaRPr lang="pt-BR" sz="2200" dirty="0" smtClean="0"/>
           </a:p>
           <a:p>
             <a:pPr lvl="1"/>
@@ -28389,7 +28380,6 @@
               <a:rPr lang="pt-BR" dirty="0"/>
               <a:t>Conversão e Reversão Anaglífica</a:t>
             </a:r>
-            <a:endParaRPr lang="pt-BR" dirty="0"/>
           </a:p>
         </p:txBody>
       </p:sp>
@@ -28845,13 +28835,8 @@
             <a:pPr lvl="1"/>
             <a:r>
               <a:rPr lang="pt-BR" dirty="0" smtClean="0"/>
-              <a:t>32 </a:t>
+              <a:t>32 imagens extraídas e agrupadas por</a:t>
             </a:r>
-            <a:r>
-              <a:rPr lang="pt-BR" dirty="0" smtClean="0"/>
-              <a:t>imagens extraídas e agrupadas por</a:t>
-            </a:r>
-            <a:endParaRPr lang="pt-BR" dirty="0" smtClean="0"/>
           </a:p>
           <a:p>
             <a:pPr lvl="2"/>
@@ -29006,7 +28991,6 @@
               <a:rPr lang="pt-BR" dirty="0"/>
               <a:t>Experimentos e Resultados Obtidos</a:t>
             </a:r>
-            <a:endParaRPr lang="pt-BR" dirty="0"/>
           </a:p>
         </p:txBody>
       </p:sp>
@@ -29546,11 +29530,7 @@
           <a:p>
             <a:r>
               <a:rPr lang="pt-BR" u="sng" dirty="0" smtClean="0"/>
-              <a:t>Roteiro</a:t>
-            </a:r>
-            <a:r>
-              <a:rPr lang="pt-BR" u="sng" dirty="0" smtClean="0"/>
-              <a:t>						        	.</a:t>
+              <a:t>Roteiro						        	.</a:t>
             </a:r>
             <a:endParaRPr lang="pt-BR" u="sng" dirty="0"/>
           </a:p>
@@ -30685,6 +30665,24 @@
           <a:lstStyle/>
           <a:p>
             <a:pPr algn="r"/>
+            <a:r>
+              <a:rPr lang="pt-BR" sz="1200" dirty="0" smtClean="0"/>
+              <a:t>Agradecimentos</a:t>
+            </a:r>
+          </a:p>
+          <a:p>
+            <a:pPr algn="r"/>
+            <a:r>
+              <a:rPr lang="pt-BR" sz="1200" dirty="0" smtClean="0"/>
+              <a:t>CNPq</a:t>
+            </a:r>
+          </a:p>
+          <a:p>
+            <a:pPr algn="r"/>
+            <a:r>
+              <a:rPr lang="pt-BR" sz="1200" dirty="0" smtClean="0"/>
+              <a:t>FAPESP</a:t>
+            </a:r>
             <a:endParaRPr lang="pt-BR" sz="1200" dirty="0"/>
           </a:p>
         </p:txBody>
@@ -30807,7 +30805,6 @@
               <a:rPr lang="pt-BR" dirty="0"/>
               <a:t>Novos Experimentos… Novos Resultados</a:t>
             </a:r>
-            <a:endParaRPr lang="pt-BR" dirty="0"/>
           </a:p>
         </p:txBody>
       </p:sp>
@@ -31797,7 +31794,6 @@
               <a:rPr lang="pt-BR" sz="1500" dirty="0" smtClean="0"/>
               <a:t>Simples</a:t>
             </a:r>
-            <a:endParaRPr lang="pt-BR" sz="1500" dirty="0" smtClean="0"/>
           </a:p>
           <a:p>
             <a:pPr marL="285750" indent="-285750">
@@ -31806,13 +31802,8 @@
             </a:pPr>
             <a:r>
               <a:rPr lang="pt-BR" sz="1500" dirty="0" smtClean="0"/>
-              <a:t>Redução de 50% do volume de </a:t>
+              <a:t>Redução de 50% do volume de dados</a:t>
             </a:r>
-            <a:r>
-              <a:rPr lang="pt-BR" sz="1500" dirty="0" smtClean="0"/>
-              <a:t>dados</a:t>
-            </a:r>
-            <a:endParaRPr lang="pt-BR" sz="1500" dirty="0" smtClean="0"/>
           </a:p>
         </p:txBody>
       </p:sp>
@@ -31994,7 +31985,6 @@
               <a:rPr lang="pt-BR" sz="1500" dirty="0" smtClean="0"/>
               <a:t>Simples</a:t>
             </a:r>
-            <a:endParaRPr lang="pt-BR" sz="1500" dirty="0" smtClean="0"/>
           </a:p>
           <a:p>
             <a:pPr marL="285750" indent="-285750">
@@ -32003,13 +31993,8 @@
             </a:pPr>
             <a:r>
               <a:rPr lang="pt-BR" sz="1500" dirty="0" smtClean="0"/>
-              <a:t>Redução de 50% do volume de </a:t>
+              <a:t>Redução de 50% do volume de dados</a:t>
             </a:r>
-            <a:r>
-              <a:rPr lang="pt-BR" sz="1500" dirty="0" smtClean="0"/>
-              <a:t>dados</a:t>
-            </a:r>
-            <a:endParaRPr lang="pt-BR" sz="1500" dirty="0" smtClean="0"/>
           </a:p>
         </p:txBody>
       </p:sp>
@@ -32059,7 +32044,6 @@
               <a:rPr lang="pt-BR" sz="1500" dirty="0" smtClean="0"/>
               <a:t>Incompatível</a:t>
             </a:r>
-            <a:endParaRPr lang="pt-BR" sz="1500" dirty="0" smtClean="0"/>
           </a:p>
         </p:txBody>
       </p:sp>

</xml_diff>